<commit_message>
/ ‘sse/postfix/test_mailgateway.pdf’ / ‘sse/postfix/test_mailgateway.pptx’ / ‘sse/virtualization/ganeti-exercise.html’
</commit_message>
<xml_diff>
--- a/sse/postfix/test_mailgateway.pptx
+++ b/sse/postfix/test_mailgateway.pptx
@@ -7,9 +7,10 @@
   <p:sldIdLst>
     <p:sldId id="256" r:id="rId2"/>
     <p:sldId id="257" r:id="rId3"/>
-    <p:sldId id="258" r:id="rId4"/>
-    <p:sldId id="259" r:id="rId5"/>
-    <p:sldId id="260" r:id="rId6"/>
+    <p:sldId id="261" r:id="rId4"/>
+    <p:sldId id="258" r:id="rId5"/>
+    <p:sldId id="259" r:id="rId6"/>
+    <p:sldId id="260" r:id="rId7"/>
   </p:sldIdLst>
   <p:sldSz cx="9144000" cy="6858000" type="screen4x3"/>
   <p:notesSz cx="6858000" cy="9144000"/>
@@ -292,7 +293,7 @@
           <a:p>
             <a:fld id="{69F4E365-C164-9F4C-BE91-D356485F9B70}" type="datetimeFigureOut">
               <a:rPr lang="en-US" smtClean="0"/>
-              <a:t>5/27/15</a:t>
+              <a:t>5/29/15</a:t>
             </a:fld>
             <a:endParaRPr lang="en-US"/>
           </a:p>
@@ -462,7 +463,7 @@
           <a:p>
             <a:fld id="{69F4E365-C164-9F4C-BE91-D356485F9B70}" type="datetimeFigureOut">
               <a:rPr lang="en-US" smtClean="0"/>
-              <a:t>5/28/15</a:t>
+              <a:t>5/29/15</a:t>
             </a:fld>
             <a:endParaRPr lang="en-US"/>
           </a:p>
@@ -642,7 +643,7 @@
           <a:p>
             <a:fld id="{69F4E365-C164-9F4C-BE91-D356485F9B70}" type="datetimeFigureOut">
               <a:rPr lang="en-US" smtClean="0"/>
-              <a:t>5/28/15</a:t>
+              <a:t>5/29/15</a:t>
             </a:fld>
             <a:endParaRPr lang="en-US"/>
           </a:p>
@@ -812,7 +813,7 @@
           <a:p>
             <a:fld id="{69F4E365-C164-9F4C-BE91-D356485F9B70}" type="datetimeFigureOut">
               <a:rPr lang="en-US" smtClean="0"/>
-              <a:t>5/28/15</a:t>
+              <a:t>5/29/15</a:t>
             </a:fld>
             <a:endParaRPr lang="en-US"/>
           </a:p>
@@ -1058,7 +1059,7 @@
           <a:p>
             <a:fld id="{69F4E365-C164-9F4C-BE91-D356485F9B70}" type="datetimeFigureOut">
               <a:rPr lang="en-US" smtClean="0"/>
-              <a:t>5/28/15</a:t>
+              <a:t>5/29/15</a:t>
             </a:fld>
             <a:endParaRPr lang="en-US"/>
           </a:p>
@@ -1346,7 +1347,7 @@
           <a:p>
             <a:fld id="{69F4E365-C164-9F4C-BE91-D356485F9B70}" type="datetimeFigureOut">
               <a:rPr lang="en-US" smtClean="0"/>
-              <a:t>5/28/15</a:t>
+              <a:t>5/29/15</a:t>
             </a:fld>
             <a:endParaRPr lang="en-US"/>
           </a:p>
@@ -1768,7 +1769,7 @@
           <a:p>
             <a:fld id="{69F4E365-C164-9F4C-BE91-D356485F9B70}" type="datetimeFigureOut">
               <a:rPr lang="en-US" smtClean="0"/>
-              <a:t>5/28/15</a:t>
+              <a:t>5/29/15</a:t>
             </a:fld>
             <a:endParaRPr lang="en-US"/>
           </a:p>
@@ -1886,7 +1887,7 @@
           <a:p>
             <a:fld id="{69F4E365-C164-9F4C-BE91-D356485F9B70}" type="datetimeFigureOut">
               <a:rPr lang="en-US" smtClean="0"/>
-              <a:t>5/28/15</a:t>
+              <a:t>5/29/15</a:t>
             </a:fld>
             <a:endParaRPr lang="en-US"/>
           </a:p>
@@ -1981,7 +1982,7 @@
           <a:p>
             <a:fld id="{69F4E365-C164-9F4C-BE91-D356485F9B70}" type="datetimeFigureOut">
               <a:rPr lang="en-US" smtClean="0"/>
-              <a:t>5/28/15</a:t>
+              <a:t>5/29/15</a:t>
             </a:fld>
             <a:endParaRPr lang="en-US"/>
           </a:p>
@@ -2258,7 +2259,7 @@
           <a:p>
             <a:fld id="{69F4E365-C164-9F4C-BE91-D356485F9B70}" type="datetimeFigureOut">
               <a:rPr lang="en-US" smtClean="0"/>
-              <a:t>5/28/15</a:t>
+              <a:t>5/29/15</a:t>
             </a:fld>
             <a:endParaRPr lang="en-US"/>
           </a:p>
@@ -2511,7 +2512,7 @@
           <a:p>
             <a:fld id="{69F4E365-C164-9F4C-BE91-D356485F9B70}" type="datetimeFigureOut">
               <a:rPr lang="en-US" smtClean="0"/>
-              <a:t>5/28/15</a:t>
+              <a:t>5/29/15</a:t>
             </a:fld>
             <a:endParaRPr lang="en-US"/>
           </a:p>
@@ -2724,7 +2725,7 @@
           <a:p>
             <a:fld id="{69F4E365-C164-9F4C-BE91-D356485F9B70}" type="datetimeFigureOut">
               <a:rPr lang="en-US" smtClean="0"/>
-              <a:t>5/27/15</a:t>
+              <a:t>5/29/15</a:t>
             </a:fld>
             <a:endParaRPr lang="en-US"/>
           </a:p>
@@ -3220,17 +3221,21 @@
           <a:p>
             <a:r>
               <a:rPr lang="en-US" dirty="0" smtClean="0"/>
-              <a:t>Add </a:t>
+              <a:t>Enter </a:t>
             </a:r>
             <a:r>
               <a:rPr lang="en-US" dirty="0" smtClean="0">
                 <a:hlinkClick r:id="rId3"/>
               </a:rPr>
-              <a:t>afnog@pcX.sse.ws.afnog.org</a:t>
+              <a:t>afnog@your.domain</a:t>
             </a:r>
             <a:r>
               <a:rPr lang="en-US" dirty="0" smtClean="0"/>
-              <a:t> as the email to receive SPAM</a:t>
+              <a:t> as </a:t>
+            </a:r>
+            <a:r>
+              <a:rPr lang="en-US" dirty="0" smtClean="0"/>
+              <a:t>the email to receive SPAM</a:t>
             </a:r>
           </a:p>
           <a:p>
@@ -3288,6 +3293,92 @@
 </file>
 
 <file path=ppt/slides/slide3.xml><?xml version="1.0" encoding="utf-8"?>
+<p:sld xmlns:a="http://schemas.openxmlformats.org/drawingml/2006/main" xmlns:r="http://schemas.openxmlformats.org/officeDocument/2006/relationships" xmlns:p="http://schemas.openxmlformats.org/presentationml/2006/main">
+  <p:cSld>
+    <p:spTree>
+      <p:nvGrpSpPr>
+        <p:cNvPr id="1" name=""/>
+        <p:cNvGrpSpPr/>
+        <p:nvPr/>
+      </p:nvGrpSpPr>
+      <p:grpSpPr>
+        <a:xfrm>
+          <a:off x="0" y="0"/>
+          <a:ext cx="0" cy="0"/>
+          <a:chOff x="0" y="0"/>
+          <a:chExt cx="0" cy="0"/>
+        </a:xfrm>
+      </p:grpSpPr>
+      <p:sp>
+        <p:nvSpPr>
+          <p:cNvPr id="2" name="Title 1"/>
+          <p:cNvSpPr>
+            <a:spLocks noGrp="1"/>
+          </p:cNvSpPr>
+          <p:nvPr>
+            <p:ph type="title"/>
+          </p:nvPr>
+        </p:nvSpPr>
+        <p:spPr/>
+        <p:txBody>
+          <a:bodyPr/>
+          <a:lstStyle/>
+          <a:p>
+            <a:r>
+              <a:rPr lang="en-US" dirty="0" smtClean="0"/>
+              <a:t>Click on the # on the emai</a:t>
+            </a:r>
+            <a:r>
+              <a:rPr lang="en-US" dirty="0"/>
+              <a:t>l</a:t>
+            </a:r>
+          </a:p>
+        </p:txBody>
+      </p:sp>
+      <p:pic>
+        <p:nvPicPr>
+          <p:cNvPr id="4" name="Picture 3" descr="Screen Shot 2015-05-29 at 2.43.34 PM.png"/>
+          <p:cNvPicPr>
+            <a:picLocks noChangeAspect="1"/>
+          </p:cNvPicPr>
+          <p:nvPr/>
+        </p:nvPicPr>
+        <p:blipFill>
+          <a:blip r:embed="rId2">
+            <a:extLst>
+              <a:ext uri="{28A0092B-C50C-407E-A947-70E740481C1C}">
+                <a14:useLocalDpi xmlns:a14="http://schemas.microsoft.com/office/drawing/2010/main" val="0"/>
+              </a:ext>
+            </a:extLst>
+          </a:blip>
+          <a:stretch>
+            <a:fillRect/>
+          </a:stretch>
+        </p:blipFill>
+        <p:spPr>
+          <a:xfrm>
+            <a:off x="774700" y="3200399"/>
+            <a:ext cx="7594600" cy="656851"/>
+          </a:xfrm>
+          <a:prstGeom prst="rect">
+            <a:avLst/>
+          </a:prstGeom>
+        </p:spPr>
+      </p:pic>
+    </p:spTree>
+    <p:extLst>
+      <p:ext uri="{BB962C8B-B14F-4D97-AF65-F5344CB8AC3E}">
+        <p14:creationId xmlns:p14="http://schemas.microsoft.com/office/powerpoint/2010/main" val="4260374997"/>
+      </p:ext>
+    </p:extLst>
+  </p:cSld>
+  <p:clrMapOvr>
+    <a:masterClrMapping/>
+  </p:clrMapOvr>
+</p:sld>
+</file>
+
+<file path=ppt/slides/slide4.xml><?xml version="1.0" encoding="utf-8"?>
 <p:sld xmlns:a="http://schemas.openxmlformats.org/drawingml/2006/main" xmlns:r="http://schemas.openxmlformats.org/officeDocument/2006/relationships" xmlns:p="http://schemas.openxmlformats.org/presentationml/2006/main">
   <p:cSld>
     <p:spTree>
@@ -3372,7 +3463,7 @@
 </p:sld>
 </file>
 
-<file path=ppt/slides/slide4.xml><?xml version="1.0" encoding="utf-8"?>
+<file path=ppt/slides/slide5.xml><?xml version="1.0" encoding="utf-8"?>
 <p:sld xmlns:a="http://schemas.openxmlformats.org/drawingml/2006/main" xmlns:r="http://schemas.openxmlformats.org/officeDocument/2006/relationships" xmlns:p="http://schemas.openxmlformats.org/presentationml/2006/main">
   <p:cSld>
     <p:spTree>
@@ -3434,7 +3525,7 @@
         </p:blipFill>
         <p:spPr>
           <a:xfrm>
-            <a:off x="0" y="2730500"/>
+            <a:off x="457200" y="2571737"/>
             <a:ext cx="9144000" cy="1373160"/>
           </a:xfrm>
           <a:prstGeom prst="rect">
@@ -3455,7 +3546,7 @@
 </p:sld>
 </file>
 
-<file path=ppt/slides/slide5.xml><?xml version="1.0" encoding="utf-8"?>
+<file path=ppt/slides/slide6.xml><?xml version="1.0" encoding="utf-8"?>
 <p:sld xmlns:a="http://schemas.openxmlformats.org/drawingml/2006/main" xmlns:r="http://schemas.openxmlformats.org/officeDocument/2006/relationships" xmlns:p="http://schemas.openxmlformats.org/presentationml/2006/main">
   <p:cSld>
     <p:spTree>
@@ -3527,7 +3618,15 @@
             </a:r>
             <a:r>
               <a:rPr lang="en-US" dirty="0" smtClean="0"/>
-              <a:t> tail –f /</a:t>
+              <a:t> tail </a:t>
+            </a:r>
+            <a:r>
+              <a:rPr lang="en-US" dirty="0" smtClean="0"/>
+              <a:t>-f </a:t>
+            </a:r>
+            <a:r>
+              <a:rPr lang="en-US" dirty="0" smtClean="0"/>
+              <a:t>/</a:t>
             </a:r>
             <a:r>
               <a:rPr lang="en-US" dirty="0" err="1" smtClean="0"/>
@@ -3579,7 +3678,7 @@
         </p:blipFill>
         <p:spPr>
           <a:xfrm>
-            <a:off x="0" y="3271054"/>
+            <a:off x="0" y="2794764"/>
             <a:ext cx="9144000" cy="2011342"/>
           </a:xfrm>
           <a:prstGeom prst="rect">
@@ -3587,6 +3686,52 @@
           </a:prstGeom>
         </p:spPr>
       </p:pic>
+      <p:sp>
+        <p:nvSpPr>
+          <p:cNvPr id="5" name="Title 1"/>
+          <p:cNvSpPr txBox="1">
+            <a:spLocks/>
+          </p:cNvSpPr>
+          <p:nvPr/>
+        </p:nvSpPr>
+        <p:spPr>
+          <a:xfrm>
+            <a:off x="457200" y="5214354"/>
+            <a:ext cx="8229600" cy="1143000"/>
+          </a:xfrm>
+          <a:prstGeom prst="rect">
+            <a:avLst/>
+          </a:prstGeom>
+        </p:spPr>
+        <p:txBody>
+          <a:bodyPr vert="horz" lIns="91440" tIns="45720" rIns="91440" bIns="45720" rtlCol="0" anchor="ctr">
+            <a:normAutofit fontScale="92500" lnSpcReduction="20000"/>
+          </a:bodyPr>
+          <a:lstStyle>
+            <a:lvl1pPr algn="ctr" defTabSz="457200" rtl="0" eaLnBrk="1" latinLnBrk="0" hangingPunct="1">
+              <a:spcBef>
+                <a:spcPct val="0"/>
+              </a:spcBef>
+              <a:buNone/>
+              <a:defRPr sz="4400" kern="1200">
+                <a:solidFill>
+                  <a:schemeClr val="tx1"/>
+                </a:solidFill>
+                <a:latin typeface="+mj-lt"/>
+                <a:ea typeface="+mj-ea"/>
+                <a:cs typeface="+mj-cs"/>
+              </a:defRPr>
+            </a:lvl1pPr>
+          </a:lstStyle>
+          <a:p>
+            <a:r>
+              <a:rPr lang="en-US" b="1" dirty="0" smtClean="0"/>
+              <a:t>Click on the individual emails to see why they are scored</a:t>
+            </a:r>
+            <a:endParaRPr lang="en-US" b="1" dirty="0"/>
+          </a:p>
+        </p:txBody>
+      </p:sp>
     </p:spTree>
     <p:extLst>
       <p:ext uri="{BB962C8B-B14F-4D97-AF65-F5344CB8AC3E}">

</xml_diff>